<commit_message>
WHOA COMMIT Präsi und JS eleganter gemacht
</commit_message>
<xml_diff>
--- a/Abschlusspräsentation.pptx
+++ b/Abschlusspräsentation.pptx
@@ -14,6 +14,7 @@
     <p:sldId id="266" r:id="rId8"/>
     <p:sldId id="267" r:id="rId9"/>
     <p:sldId id="265" r:id="rId10"/>
+    <p:sldId id="268" r:id="rId11"/>
   </p:sldIdLst>
   <p:sldSz cx="12192000" cy="6858000"/>
   <p:notesSz cx="6858000" cy="9144000"/>
@@ -112,6 +113,11 @@
       </a:defRPr>
     </a:lvl9pPr>
   </p:defaultTextStyle>
+  <p:extLst>
+    <p:ext uri="{EFAFB233-063F-42B5-8137-9DF3F51BA10A}">
+      <p15:sldGuideLst xmlns:p15="http://schemas.microsoft.com/office/powerpoint/2012/main"/>
+    </p:ext>
+  </p:extLst>
 </p:presentation>
 </file>
 
@@ -3068,6 +3074,808 @@
 </p:sld>
 </file>
 
+<file path=ppt/slides/slide10.xml><?xml version="1.0" encoding="utf-8"?>
+<p:sld xmlns:a="http://schemas.openxmlformats.org/drawingml/2006/main" xmlns:r="http://schemas.openxmlformats.org/officeDocument/2006/relationships" xmlns:p="http://schemas.openxmlformats.org/presentationml/2006/main">
+  <p:cSld>
+    <p:spTree>
+      <p:nvGrpSpPr>
+        <p:cNvPr id="1" name=""/>
+        <p:cNvGrpSpPr/>
+        <p:nvPr/>
+      </p:nvGrpSpPr>
+      <p:grpSpPr>
+        <a:xfrm>
+          <a:off x="0" y="0"/>
+          <a:ext cx="0" cy="0"/>
+          <a:chOff x="0" y="0"/>
+          <a:chExt cx="0" cy="0"/>
+        </a:xfrm>
+      </p:grpSpPr>
+      <p:sp>
+        <p:nvSpPr>
+          <p:cNvPr id="2" name="Titel 1"/>
+          <p:cNvSpPr>
+            <a:spLocks noGrp="1"/>
+          </p:cNvSpPr>
+          <p:nvPr>
+            <p:ph type="title"/>
+          </p:nvPr>
+        </p:nvSpPr>
+        <p:spPr/>
+        <p:txBody>
+          <a:bodyPr/>
+          <a:lstStyle/>
+          <a:p>
+            <a:r>
+              <a:rPr lang="de-DE" dirty="0" smtClean="0"/>
+              <a:t>Java Script</a:t>
+            </a:r>
+            <a:endParaRPr lang="de-DE" dirty="0"/>
+          </a:p>
+        </p:txBody>
+      </p:sp>
+      <p:sp>
+        <p:nvSpPr>
+          <p:cNvPr id="4" name="Inhaltsplatzhalter 3"/>
+          <p:cNvSpPr>
+            <a:spLocks noGrp="1"/>
+          </p:cNvSpPr>
+          <p:nvPr>
+            <p:ph sz="half" idx="2"/>
+          </p:nvPr>
+        </p:nvSpPr>
+        <p:spPr>
+          <a:xfrm>
+            <a:off x="7013196" y="1825625"/>
+            <a:ext cx="4340604" cy="4351338"/>
+          </a:xfrm>
+        </p:spPr>
+        <p:txBody>
+          <a:bodyPr/>
+          <a:lstStyle/>
+          <a:p>
+            <a:r>
+              <a:rPr lang="de-DE" dirty="0" smtClean="0"/>
+              <a:t>Liest die Termine aus der JSON Datei</a:t>
+            </a:r>
+          </a:p>
+          <a:p>
+            <a:r>
+              <a:rPr lang="de-DE" dirty="0" smtClean="0"/>
+              <a:t>Erstellt die Zeilen der Tabellen</a:t>
+            </a:r>
+            <a:r>
+              <a:rPr lang="de-DE" dirty="0"/>
+              <a:t> </a:t>
+            </a:r>
+            <a:r>
+              <a:rPr lang="de-DE" dirty="0" smtClean="0"/>
+              <a:t>während es ausliest</a:t>
+            </a:r>
+          </a:p>
+          <a:p>
+            <a:r>
+              <a:rPr lang="de-DE" dirty="0" smtClean="0"/>
+              <a:t>Ändert Farbe basierend auf Modulo</a:t>
+            </a:r>
+          </a:p>
+        </p:txBody>
+      </p:sp>
+      <p:sp>
+        <p:nvSpPr>
+          <p:cNvPr id="5" name="Rechteck 4"/>
+          <p:cNvSpPr/>
+          <p:nvPr/>
+        </p:nvSpPr>
+        <p:spPr>
+          <a:xfrm>
+            <a:off x="-2133600" y="1482423"/>
+            <a:ext cx="14679827" cy="5262979"/>
+          </a:xfrm>
+          <a:prstGeom prst="rect">
+            <a:avLst/>
+          </a:prstGeom>
+        </p:spPr>
+        <p:txBody>
+          <a:bodyPr wrap="square">
+            <a:spAutoFit/>
+          </a:bodyPr>
+          <a:lstStyle/>
+          <a:p>
+            <a:r>
+              <a:rPr lang="de-DE" sz="1400" dirty="0">
+                <a:solidFill>
+                  <a:schemeClr val="tx1">
+                    <a:lumMod val="50000"/>
+                    <a:lumOff val="50000"/>
+                  </a:schemeClr>
+                </a:solidFill>
+              </a:rPr>
+              <a:t>			//Verweist eine Variable "</a:t>
+            </a:r>
+            <a:r>
+              <a:rPr lang="de-DE" sz="1400" dirty="0" err="1">
+                <a:solidFill>
+                  <a:schemeClr val="accent4"/>
+                </a:solidFill>
+              </a:rPr>
+              <a:t>table</a:t>
+            </a:r>
+            <a:r>
+              <a:rPr lang="de-DE" sz="1400" dirty="0">
+                <a:solidFill>
+                  <a:schemeClr val="tx1">
+                    <a:lumMod val="50000"/>
+                    <a:lumOff val="50000"/>
+                  </a:schemeClr>
+                </a:solidFill>
+              </a:rPr>
+              <a:t>" auf die korrekte Tabelle.</a:t>
+            </a:r>
+          </a:p>
+          <a:p>
+            <a:r>
+              <a:rPr lang="de-DE" sz="1400" dirty="0"/>
+              <a:t>			</a:t>
+            </a:r>
+            <a:r>
+              <a:rPr lang="de-DE" sz="1400" dirty="0" err="1">
+                <a:solidFill>
+                  <a:srgbClr val="FF0000"/>
+                </a:solidFill>
+              </a:rPr>
+              <a:t>var</a:t>
+            </a:r>
+            <a:r>
+              <a:rPr lang="de-DE" sz="1400" dirty="0">
+                <a:solidFill>
+                  <a:srgbClr val="FF0000"/>
+                </a:solidFill>
+              </a:rPr>
+              <a:t> </a:t>
+            </a:r>
+            <a:r>
+              <a:rPr lang="de-DE" sz="1400" dirty="0" err="1" smtClean="0">
+                <a:solidFill>
+                  <a:schemeClr val="accent4"/>
+                </a:solidFill>
+              </a:rPr>
+              <a:t>table</a:t>
+            </a:r>
+            <a:r>
+              <a:rPr lang="de-DE" sz="1400" dirty="0" smtClean="0">
+                <a:solidFill>
+                  <a:schemeClr val="accent4"/>
+                </a:solidFill>
+              </a:rPr>
+              <a:t> </a:t>
+            </a:r>
+            <a:r>
+              <a:rPr lang="de-DE" sz="1400" dirty="0"/>
+              <a:t>= </a:t>
+            </a:r>
+            <a:r>
+              <a:rPr lang="de-DE" sz="1400" dirty="0" err="1"/>
+              <a:t>document.getElementById</a:t>
+            </a:r>
+            <a:r>
+              <a:rPr lang="de-DE" sz="1400" dirty="0"/>
+              <a:t>("</a:t>
+            </a:r>
+            <a:r>
+              <a:rPr lang="de-DE" sz="1400" dirty="0" err="1"/>
+              <a:t>termTab</a:t>
+            </a:r>
+            <a:r>
+              <a:rPr lang="de-DE" sz="1400" dirty="0"/>
+              <a:t>");</a:t>
+            </a:r>
+          </a:p>
+          <a:p>
+            <a:r>
+              <a:rPr lang="de-DE" sz="1400" dirty="0">
+                <a:solidFill>
+                  <a:schemeClr val="tx1">
+                    <a:lumMod val="50000"/>
+                    <a:lumOff val="50000"/>
+                  </a:schemeClr>
+                </a:solidFill>
+              </a:rPr>
+              <a:t>			//Durchläuft alle Termine in der JSON Datei.</a:t>
+            </a:r>
+          </a:p>
+          <a:p>
+            <a:r>
+              <a:rPr lang="de-DE" sz="1400" dirty="0"/>
+              <a:t>			</a:t>
+            </a:r>
+            <a:r>
+              <a:rPr lang="de-DE" sz="1400" dirty="0" err="1"/>
+              <a:t>for</a:t>
+            </a:r>
+            <a:r>
+              <a:rPr lang="de-DE" sz="1400" dirty="0"/>
+              <a:t>(i= 0; i &lt; </a:t>
+            </a:r>
+            <a:r>
+              <a:rPr lang="de-DE" sz="1400" dirty="0" err="1"/>
+              <a:t>data.termine.length</a:t>
+            </a:r>
+            <a:r>
+              <a:rPr lang="de-DE" sz="1400" dirty="0"/>
+              <a:t> ; i++)</a:t>
+            </a:r>
+          </a:p>
+          <a:p>
+            <a:r>
+              <a:rPr lang="de-DE" sz="1400" dirty="0"/>
+              <a:t>			</a:t>
+            </a:r>
+            <a:r>
+              <a:rPr lang="de-DE" sz="1400" dirty="0" smtClean="0"/>
+              <a:t>{</a:t>
+            </a:r>
+            <a:endParaRPr lang="de-DE" sz="1400" dirty="0"/>
+          </a:p>
+          <a:p>
+            <a:r>
+              <a:rPr lang="de-DE" sz="1400" dirty="0"/>
+              <a:t>				</a:t>
+            </a:r>
+            <a:r>
+              <a:rPr lang="de-DE" sz="1400" dirty="0">
+                <a:solidFill>
+                  <a:schemeClr val="tx1">
+                    <a:lumMod val="50000"/>
+                    <a:lumOff val="50000"/>
+                  </a:schemeClr>
+                </a:solidFill>
+              </a:rPr>
+              <a:t>//Variable "</a:t>
+            </a:r>
+            <a:r>
+              <a:rPr lang="de-DE" sz="1400" dirty="0" err="1">
+                <a:solidFill>
+                  <a:srgbClr val="7030A0"/>
+                </a:solidFill>
+              </a:rPr>
+              <a:t>zeile</a:t>
+            </a:r>
+            <a:r>
+              <a:rPr lang="de-DE" sz="1400" dirty="0">
+                <a:solidFill>
+                  <a:schemeClr val="tx1">
+                    <a:lumMod val="50000"/>
+                    <a:lumOff val="50000"/>
+                  </a:schemeClr>
+                </a:solidFill>
+              </a:rPr>
+              <a:t>" wird erstellt für eine neue Zeile, </a:t>
+            </a:r>
+          </a:p>
+          <a:p>
+            <a:r>
+              <a:rPr lang="de-DE" sz="1400" dirty="0">
+                <a:solidFill>
+                  <a:schemeClr val="tx1">
+                    <a:lumMod val="50000"/>
+                    <a:lumOff val="50000"/>
+                  </a:schemeClr>
+                </a:solidFill>
+              </a:rPr>
+              <a:t>				//welche unter der aktuellen Zeile von "</a:t>
+            </a:r>
+            <a:r>
+              <a:rPr lang="de-DE" sz="1400" dirty="0" err="1">
+                <a:solidFill>
+                  <a:schemeClr val="accent4"/>
+                </a:solidFill>
+              </a:rPr>
+              <a:t>table</a:t>
+            </a:r>
+            <a:r>
+              <a:rPr lang="de-DE" sz="1400" dirty="0">
+                <a:solidFill>
+                  <a:schemeClr val="tx1">
+                    <a:lumMod val="50000"/>
+                    <a:lumOff val="50000"/>
+                  </a:schemeClr>
+                </a:solidFill>
+              </a:rPr>
+              <a:t>" eingesetzt wird.</a:t>
+            </a:r>
+          </a:p>
+          <a:p>
+            <a:r>
+              <a:rPr lang="de-DE" sz="1400" dirty="0"/>
+              <a:t>				</a:t>
+            </a:r>
+            <a:r>
+              <a:rPr lang="de-DE" sz="1400" dirty="0" err="1">
+                <a:solidFill>
+                  <a:srgbClr val="FF0000"/>
+                </a:solidFill>
+              </a:rPr>
+              <a:t>var</a:t>
+            </a:r>
+            <a:r>
+              <a:rPr lang="de-DE" sz="1400" dirty="0">
+                <a:solidFill>
+                  <a:srgbClr val="FF0000"/>
+                </a:solidFill>
+              </a:rPr>
+              <a:t> </a:t>
+            </a:r>
+            <a:r>
+              <a:rPr lang="de-DE" sz="1400" dirty="0" err="1">
+                <a:solidFill>
+                  <a:srgbClr val="7030A0"/>
+                </a:solidFill>
+              </a:rPr>
+              <a:t>zeile</a:t>
+            </a:r>
+            <a:r>
+              <a:rPr lang="de-DE" sz="1400" dirty="0">
+                <a:solidFill>
+                  <a:srgbClr val="7030A0"/>
+                </a:solidFill>
+              </a:rPr>
+              <a:t> </a:t>
+            </a:r>
+            <a:r>
+              <a:rPr lang="de-DE" sz="1400" dirty="0"/>
+              <a:t>= </a:t>
+            </a:r>
+            <a:r>
+              <a:rPr lang="de-DE" sz="1400" dirty="0" err="1">
+                <a:solidFill>
+                  <a:schemeClr val="accent4"/>
+                </a:solidFill>
+              </a:rPr>
+              <a:t>table</a:t>
+            </a:r>
+            <a:r>
+              <a:rPr lang="de-DE" sz="1400" dirty="0" err="1"/>
+              <a:t>.insertRow</a:t>
+            </a:r>
+            <a:r>
+              <a:rPr lang="de-DE" sz="1400" dirty="0"/>
+              <a:t>(i+1);</a:t>
+            </a:r>
+          </a:p>
+          <a:p>
+            <a:r>
+              <a:rPr lang="de-DE" sz="1400" dirty="0"/>
+              <a:t>				</a:t>
+            </a:r>
+            <a:r>
+              <a:rPr lang="de-DE" sz="1400" dirty="0">
+                <a:solidFill>
+                  <a:schemeClr val="tx1">
+                    <a:lumMod val="50000"/>
+                    <a:lumOff val="50000"/>
+                  </a:schemeClr>
+                </a:solidFill>
+              </a:rPr>
+              <a:t>//Ist die Zeile eine gerade Zeile in der Aufzählung, wird sie grau hinterlegt.</a:t>
+            </a:r>
+          </a:p>
+          <a:p>
+            <a:r>
+              <a:rPr lang="de-DE" sz="1400" dirty="0"/>
+              <a:t>				</a:t>
+            </a:r>
+            <a:r>
+              <a:rPr lang="de-DE" sz="1400" dirty="0" err="1"/>
+              <a:t>if</a:t>
+            </a:r>
+            <a:r>
+              <a:rPr lang="de-DE" sz="1400" dirty="0"/>
+              <a:t>(i%2 == 0)</a:t>
+            </a:r>
+          </a:p>
+          <a:p>
+            <a:r>
+              <a:rPr lang="de-DE" sz="1400" dirty="0"/>
+              <a:t>				{</a:t>
+            </a:r>
+          </a:p>
+          <a:p>
+            <a:r>
+              <a:rPr lang="de-DE" sz="1400" dirty="0"/>
+              <a:t>					</a:t>
+            </a:r>
+            <a:r>
+              <a:rPr lang="de-DE" sz="1400" dirty="0" err="1">
+                <a:solidFill>
+                  <a:srgbClr val="7030A0"/>
+                </a:solidFill>
+              </a:rPr>
+              <a:t>zeile</a:t>
+            </a:r>
+            <a:r>
+              <a:rPr lang="de-DE" sz="1400" dirty="0" err="1"/>
+              <a:t>.style.backgroundColor</a:t>
+            </a:r>
+            <a:r>
+              <a:rPr lang="de-DE" sz="1400" dirty="0"/>
+              <a:t> = "#d3d3d3";</a:t>
+            </a:r>
+          </a:p>
+          <a:p>
+            <a:r>
+              <a:rPr lang="de-DE" sz="1400" dirty="0"/>
+              <a:t>				}</a:t>
+            </a:r>
+          </a:p>
+          <a:p>
+            <a:r>
+              <a:rPr lang="de-DE" sz="1400" dirty="0"/>
+              <a:t>				</a:t>
+            </a:r>
+            <a:r>
+              <a:rPr lang="de-DE" sz="1400" dirty="0" err="1">
+                <a:solidFill>
+                  <a:srgbClr val="FF0000"/>
+                </a:solidFill>
+              </a:rPr>
+              <a:t>var</a:t>
+            </a:r>
+            <a:r>
+              <a:rPr lang="de-DE" sz="1400" dirty="0">
+                <a:solidFill>
+                  <a:srgbClr val="FF0000"/>
+                </a:solidFill>
+              </a:rPr>
+              <a:t> </a:t>
+            </a:r>
+            <a:r>
+              <a:rPr lang="de-DE" sz="1400" dirty="0" err="1">
+                <a:solidFill>
+                  <a:srgbClr val="92D050"/>
+                </a:solidFill>
+              </a:rPr>
+              <a:t>datumSpalte</a:t>
+            </a:r>
+            <a:r>
+              <a:rPr lang="de-DE" sz="1400" dirty="0">
+                <a:solidFill>
+                  <a:srgbClr val="92D050"/>
+                </a:solidFill>
+              </a:rPr>
+              <a:t> </a:t>
+            </a:r>
+            <a:r>
+              <a:rPr lang="de-DE" sz="1400" dirty="0"/>
+              <a:t>= </a:t>
+            </a:r>
+            <a:r>
+              <a:rPr lang="de-DE" sz="1400" dirty="0" err="1">
+                <a:solidFill>
+                  <a:srgbClr val="7030A0"/>
+                </a:solidFill>
+              </a:rPr>
+              <a:t>zeile</a:t>
+            </a:r>
+            <a:r>
+              <a:rPr lang="de-DE" sz="1400" dirty="0" err="1"/>
+              <a:t>.insertCell</a:t>
+            </a:r>
+            <a:r>
+              <a:rPr lang="de-DE" sz="1400" dirty="0"/>
+              <a:t>(0);</a:t>
+            </a:r>
+          </a:p>
+          <a:p>
+            <a:r>
+              <a:rPr lang="de-DE" sz="1400" dirty="0"/>
+              <a:t>				</a:t>
+            </a:r>
+            <a:r>
+              <a:rPr lang="de-DE" sz="1400" dirty="0" err="1">
+                <a:solidFill>
+                  <a:srgbClr val="FF0000"/>
+                </a:solidFill>
+              </a:rPr>
+              <a:t>var</a:t>
+            </a:r>
+            <a:r>
+              <a:rPr lang="de-DE" sz="1400" dirty="0">
+                <a:solidFill>
+                  <a:srgbClr val="FF0000"/>
+                </a:solidFill>
+              </a:rPr>
+              <a:t> </a:t>
+            </a:r>
+            <a:r>
+              <a:rPr lang="de-DE" sz="1400" dirty="0" err="1">
+                <a:solidFill>
+                  <a:srgbClr val="92D050"/>
+                </a:solidFill>
+              </a:rPr>
+              <a:t>ereignisSpalte</a:t>
+            </a:r>
+            <a:r>
+              <a:rPr lang="de-DE" sz="1400" dirty="0">
+                <a:solidFill>
+                  <a:srgbClr val="92D050"/>
+                </a:solidFill>
+              </a:rPr>
+              <a:t> </a:t>
+            </a:r>
+            <a:r>
+              <a:rPr lang="de-DE" sz="1400" dirty="0"/>
+              <a:t>= </a:t>
+            </a:r>
+            <a:r>
+              <a:rPr lang="de-DE" sz="1400" dirty="0" err="1">
+                <a:solidFill>
+                  <a:srgbClr val="7030A0"/>
+                </a:solidFill>
+              </a:rPr>
+              <a:t>zeile</a:t>
+            </a:r>
+            <a:r>
+              <a:rPr lang="de-DE" sz="1400" dirty="0" err="1"/>
+              <a:t>.insertCell</a:t>
+            </a:r>
+            <a:r>
+              <a:rPr lang="de-DE" sz="1400" dirty="0"/>
+              <a:t>(1);</a:t>
+            </a:r>
+          </a:p>
+          <a:p>
+            <a:r>
+              <a:rPr lang="de-DE" sz="1400" dirty="0"/>
+              <a:t>				</a:t>
+            </a:r>
+            <a:r>
+              <a:rPr lang="de-DE" sz="1400" dirty="0" err="1">
+                <a:solidFill>
+                  <a:srgbClr val="FF0000"/>
+                </a:solidFill>
+              </a:rPr>
+              <a:t>var</a:t>
+            </a:r>
+            <a:r>
+              <a:rPr lang="de-DE" sz="1400" dirty="0">
+                <a:solidFill>
+                  <a:srgbClr val="FF0000"/>
+                </a:solidFill>
+              </a:rPr>
+              <a:t> </a:t>
+            </a:r>
+            <a:r>
+              <a:rPr lang="de-DE" sz="1400" dirty="0" err="1">
+                <a:solidFill>
+                  <a:srgbClr val="92D050"/>
+                </a:solidFill>
+              </a:rPr>
+              <a:t>ortSpalte</a:t>
+            </a:r>
+            <a:r>
+              <a:rPr lang="de-DE" sz="1400" dirty="0">
+                <a:solidFill>
+                  <a:srgbClr val="92D050"/>
+                </a:solidFill>
+              </a:rPr>
+              <a:t> </a:t>
+            </a:r>
+            <a:r>
+              <a:rPr lang="de-DE" sz="1400" dirty="0"/>
+              <a:t>= </a:t>
+            </a:r>
+            <a:r>
+              <a:rPr lang="de-DE" sz="1400" dirty="0" err="1">
+                <a:solidFill>
+                  <a:srgbClr val="7030A0"/>
+                </a:solidFill>
+              </a:rPr>
+              <a:t>zeile</a:t>
+            </a:r>
+            <a:r>
+              <a:rPr lang="de-DE" sz="1400" dirty="0" err="1"/>
+              <a:t>.insertCell</a:t>
+            </a:r>
+            <a:r>
+              <a:rPr lang="de-DE" sz="1400" dirty="0"/>
+              <a:t>(2);</a:t>
+            </a:r>
+          </a:p>
+          <a:p>
+            <a:r>
+              <a:rPr lang="de-DE" sz="1400" dirty="0"/>
+              <a:t>				</a:t>
+            </a:r>
+            <a:r>
+              <a:rPr lang="de-DE" sz="1400" dirty="0" err="1">
+                <a:solidFill>
+                  <a:srgbClr val="92D050"/>
+                </a:solidFill>
+              </a:rPr>
+              <a:t>datumSpalte</a:t>
+            </a:r>
+            <a:r>
+              <a:rPr lang="de-DE" sz="1400" dirty="0" err="1"/>
+              <a:t>.style.padding</a:t>
+            </a:r>
+            <a:r>
+              <a:rPr lang="de-DE" sz="1400" dirty="0"/>
+              <a:t> = "5px";</a:t>
+            </a:r>
+          </a:p>
+          <a:p>
+            <a:r>
+              <a:rPr lang="de-DE" sz="1400" dirty="0"/>
+              <a:t>				</a:t>
+            </a:r>
+            <a:r>
+              <a:rPr lang="de-DE" sz="1400" dirty="0" err="1">
+                <a:solidFill>
+                  <a:srgbClr val="92D050"/>
+                </a:solidFill>
+              </a:rPr>
+              <a:t>ereignisSpalte</a:t>
+            </a:r>
+            <a:r>
+              <a:rPr lang="de-DE" sz="1400" dirty="0" err="1"/>
+              <a:t>.style.padding</a:t>
+            </a:r>
+            <a:r>
+              <a:rPr lang="de-DE" sz="1400" dirty="0"/>
+              <a:t> = "5px";</a:t>
+            </a:r>
+          </a:p>
+          <a:p>
+            <a:r>
+              <a:rPr lang="de-DE" sz="1400" dirty="0"/>
+              <a:t>				</a:t>
+            </a:r>
+            <a:r>
+              <a:rPr lang="de-DE" sz="1400" dirty="0" err="1">
+                <a:solidFill>
+                  <a:srgbClr val="92D050"/>
+                </a:solidFill>
+              </a:rPr>
+              <a:t>ortSpalte</a:t>
+            </a:r>
+            <a:r>
+              <a:rPr lang="de-DE" sz="1400" dirty="0" err="1"/>
+              <a:t>.style.padding</a:t>
+            </a:r>
+            <a:r>
+              <a:rPr lang="de-DE" sz="1400" dirty="0"/>
+              <a:t> = "5px";</a:t>
+            </a:r>
+          </a:p>
+          <a:p>
+            <a:r>
+              <a:rPr lang="de-DE" sz="1400" dirty="0">
+                <a:solidFill>
+                  <a:schemeClr val="tx1">
+                    <a:lumMod val="50000"/>
+                    <a:lumOff val="50000"/>
+                  </a:schemeClr>
+                </a:solidFill>
+              </a:rPr>
+              <a:t>				//Weist den Zellen die jeweiligen Werte zu</a:t>
+            </a:r>
+          </a:p>
+          <a:p>
+            <a:r>
+              <a:rPr lang="de-DE" sz="1400" dirty="0"/>
+              <a:t>				</a:t>
+            </a:r>
+            <a:r>
+              <a:rPr lang="de-DE" sz="1400" dirty="0" err="1">
+                <a:solidFill>
+                  <a:srgbClr val="92D050"/>
+                </a:solidFill>
+              </a:rPr>
+              <a:t>datumSpalte</a:t>
+            </a:r>
+            <a:r>
+              <a:rPr lang="de-DE" sz="1400" dirty="0" err="1"/>
+              <a:t>.innerHTML</a:t>
+            </a:r>
+            <a:r>
+              <a:rPr lang="de-DE" sz="1400" dirty="0"/>
+              <a:t> = </a:t>
+            </a:r>
+            <a:r>
+              <a:rPr lang="de-DE" sz="1400" dirty="0" err="1"/>
+              <a:t>data.termine</a:t>
+            </a:r>
+            <a:r>
+              <a:rPr lang="de-DE" sz="1400" dirty="0"/>
+              <a:t>[i][0];</a:t>
+            </a:r>
+          </a:p>
+          <a:p>
+            <a:r>
+              <a:rPr lang="de-DE" sz="1400" dirty="0"/>
+              <a:t>				</a:t>
+            </a:r>
+            <a:r>
+              <a:rPr lang="de-DE" sz="1400" dirty="0" err="1">
+                <a:solidFill>
+                  <a:srgbClr val="92D050"/>
+                </a:solidFill>
+              </a:rPr>
+              <a:t>ereignisSpalte</a:t>
+            </a:r>
+            <a:r>
+              <a:rPr lang="de-DE" sz="1400" dirty="0" err="1"/>
+              <a:t>.innerHTML</a:t>
+            </a:r>
+            <a:r>
+              <a:rPr lang="de-DE" sz="1400" dirty="0"/>
+              <a:t> = </a:t>
+            </a:r>
+            <a:r>
+              <a:rPr lang="de-DE" sz="1400" dirty="0" err="1"/>
+              <a:t>data.termine</a:t>
+            </a:r>
+            <a:r>
+              <a:rPr lang="de-DE" sz="1400" dirty="0"/>
+              <a:t>[i][1];</a:t>
+            </a:r>
+          </a:p>
+          <a:p>
+            <a:r>
+              <a:rPr lang="de-DE" sz="1400" dirty="0"/>
+              <a:t>				</a:t>
+            </a:r>
+            <a:r>
+              <a:rPr lang="de-DE" sz="1400" dirty="0" err="1">
+                <a:solidFill>
+                  <a:srgbClr val="92D050"/>
+                </a:solidFill>
+              </a:rPr>
+              <a:t>ortSpalte</a:t>
+            </a:r>
+            <a:r>
+              <a:rPr lang="de-DE" sz="1400" dirty="0" err="1"/>
+              <a:t>.innerHTML</a:t>
+            </a:r>
+            <a:r>
+              <a:rPr lang="de-DE" sz="1400" dirty="0"/>
+              <a:t> = </a:t>
+            </a:r>
+            <a:r>
+              <a:rPr lang="de-DE" sz="1400" dirty="0" err="1"/>
+              <a:t>data.termine</a:t>
+            </a:r>
+            <a:r>
+              <a:rPr lang="de-DE" sz="1400" dirty="0"/>
+              <a:t>[i][2];</a:t>
+            </a:r>
+          </a:p>
+          <a:p>
+            <a:r>
+              <a:rPr lang="de-DE" sz="1400" dirty="0"/>
+              <a:t>			</a:t>
+            </a:r>
+            <a:r>
+              <a:rPr lang="de-DE" sz="1400" dirty="0" smtClean="0"/>
+              <a:t>}</a:t>
+            </a:r>
+          </a:p>
+        </p:txBody>
+      </p:sp>
+    </p:spTree>
+    <p:extLst>
+      <p:ext uri="{BB962C8B-B14F-4D97-AF65-F5344CB8AC3E}">
+        <p14:creationId xmlns:p14="http://schemas.microsoft.com/office/powerpoint/2010/main" val="2283913826"/>
+      </p:ext>
+    </p:extLst>
+  </p:cSld>
+  <p:clrMapOvr>
+    <a:masterClrMapping/>
+  </p:clrMapOvr>
+</p:sld>
+</file>
+
 <file path=ppt/slides/slide2.xml><?xml version="1.0" encoding="utf-8"?>
 <p:sld xmlns:a="http://schemas.openxmlformats.org/drawingml/2006/main" xmlns:r="http://schemas.openxmlformats.org/officeDocument/2006/relationships" xmlns:p="http://schemas.openxmlformats.org/presentationml/2006/main">
   <p:cSld>
@@ -3128,13 +3936,32 @@
               <a:rPr lang="de-DE" b="1" dirty="0">
                 <a:latin typeface="+mj-lt"/>
               </a:rPr>
-              <a:t>Über Veranstaltungen und Ereignisse informieren</a:t>
-            </a:r>
-            <a:endParaRPr lang="de-DE" dirty="0">
-              <a:latin typeface="+mj-lt"/>
-            </a:endParaRPr>
-          </a:p>
-          <a:p>
+              <a:t>Über Veranstaltungen und Ereignisse </a:t>
+            </a:r>
+            <a:r>
+              <a:rPr lang="de-DE" b="1" dirty="0" smtClean="0">
+                <a:latin typeface="+mj-lt"/>
+              </a:rPr>
+              <a:t>informieren</a:t>
+            </a:r>
+          </a:p>
+          <a:p>
+            <a:pPr lvl="0"/>
+            <a:r>
+              <a:rPr lang="de-DE" b="1" dirty="0" smtClean="0">
+                <a:latin typeface="+mj-lt"/>
+              </a:rPr>
+              <a:t>Über den Verein Informieren</a:t>
+            </a:r>
+          </a:p>
+          <a:p>
+            <a:pPr lvl="0"/>
+            <a:r>
+              <a:rPr lang="de-DE" b="1" dirty="0" smtClean="0">
+                <a:latin typeface="+mj-lt"/>
+              </a:rPr>
+              <a:t>Das Dorf Vorstellen und die Gemeinde präsentieren</a:t>
+            </a:r>
             <a:endParaRPr lang="de-DE" dirty="0"/>
           </a:p>
         </p:txBody>
@@ -3491,355 +4318,20 @@
       </p:sp>
       <p:sp>
         <p:nvSpPr>
-          <p:cNvPr id="3" name="Inhaltsplatzhalter 2"/>
-          <p:cNvSpPr>
-            <a:spLocks noGrp="1"/>
-          </p:cNvSpPr>
-          <p:nvPr>
-            <p:ph sz="half" idx="1"/>
+          <p:cNvPr id="4" name="Inhaltsplatzhalter 3"/>
+          <p:cNvSpPr>
+            <a:spLocks noGrp="1"/>
+          </p:cNvSpPr>
+          <p:nvPr>
+            <p:ph sz="half" idx="2"/>
           </p:nvPr>
         </p:nvSpPr>
         <p:spPr>
           <a:xfrm>
-            <a:off x="365760" y="1544320"/>
-            <a:ext cx="5654040" cy="5313679"/>
+            <a:off x="6804453" y="1690688"/>
+            <a:ext cx="4852088" cy="4351338"/>
           </a:xfrm>
         </p:spPr>
-        <p:txBody>
-          <a:bodyPr>
-            <a:noAutofit/>
-          </a:bodyPr>
-          <a:lstStyle/>
-          <a:p>
-            <a:pPr marL="0" indent="0">
-              <a:buNone/>
-            </a:pPr>
-            <a:r>
-              <a:rPr lang="de-DE" sz="1400" dirty="0" err="1" smtClean="0"/>
-              <a:t>function</a:t>
-            </a:r>
-            <a:r>
-              <a:rPr lang="de-DE" sz="1400" dirty="0" smtClean="0"/>
-              <a:t> </a:t>
-            </a:r>
-            <a:r>
-              <a:rPr lang="de-DE" sz="1400" dirty="0" err="1" smtClean="0"/>
-              <a:t>headerChange</a:t>
-            </a:r>
-            <a:r>
-              <a:rPr lang="de-DE" sz="1400" dirty="0" smtClean="0"/>
-              <a:t>() {</a:t>
-            </a:r>
-          </a:p>
-          <a:p>
-            <a:pPr marL="0" indent="0">
-              <a:buNone/>
-            </a:pPr>
-            <a:r>
-              <a:rPr lang="de-DE" sz="1400" dirty="0" smtClean="0"/>
-              <a:t>	$(</a:t>
-            </a:r>
-            <a:r>
-              <a:rPr lang="de-DE" sz="1400" dirty="0" err="1" smtClean="0"/>
-              <a:t>document</a:t>
-            </a:r>
-            <a:r>
-              <a:rPr lang="de-DE" sz="1400" dirty="0" smtClean="0"/>
-              <a:t>).</a:t>
-            </a:r>
-            <a:r>
-              <a:rPr lang="de-DE" sz="1400" dirty="0" err="1" smtClean="0"/>
-              <a:t>ready</a:t>
-            </a:r>
-            <a:r>
-              <a:rPr lang="de-DE" sz="1400" dirty="0" smtClean="0"/>
-              <a:t>(</a:t>
-            </a:r>
-            <a:r>
-              <a:rPr lang="de-DE" sz="1400" dirty="0" err="1" smtClean="0"/>
-              <a:t>function</a:t>
-            </a:r>
-            <a:r>
-              <a:rPr lang="de-DE" sz="1400" dirty="0" smtClean="0"/>
-              <a:t>(){</a:t>
-            </a:r>
-          </a:p>
-          <a:p>
-            <a:pPr marL="0" indent="0">
-              <a:buNone/>
-            </a:pPr>
-            <a:r>
-              <a:rPr lang="de-DE" sz="1400" dirty="0" smtClean="0"/>
-              <a:t>		</a:t>
-            </a:r>
-            <a:r>
-              <a:rPr lang="de-DE" sz="1400" dirty="0" err="1" smtClean="0"/>
-              <a:t>var</a:t>
-            </a:r>
-            <a:r>
-              <a:rPr lang="de-DE" sz="1400" dirty="0" smtClean="0"/>
-              <a:t> </a:t>
-            </a:r>
-            <a:r>
-              <a:rPr lang="de-DE" sz="1400" dirty="0" err="1" smtClean="0"/>
-              <a:t>interval</a:t>
-            </a:r>
-            <a:r>
-              <a:rPr lang="de-DE" sz="1400" dirty="0" smtClean="0"/>
-              <a:t>;</a:t>
-            </a:r>
-          </a:p>
-          <a:p>
-            <a:pPr marL="0" indent="0">
-              <a:buNone/>
-            </a:pPr>
-            <a:r>
-              <a:rPr lang="de-DE" sz="1400" dirty="0" smtClean="0"/>
-              <a:t>		//Zirkelt durch die vorhandenen Bilder.</a:t>
-            </a:r>
-          </a:p>
-          <a:p>
-            <a:pPr marL="0" indent="0">
-              <a:buNone/>
-            </a:pPr>
-            <a:r>
-              <a:rPr lang="de-DE" sz="1400" dirty="0" smtClean="0"/>
-              <a:t>		</a:t>
-            </a:r>
-            <a:r>
-              <a:rPr lang="de-DE" sz="1400" dirty="0" err="1" smtClean="0"/>
-              <a:t>function</a:t>
-            </a:r>
-            <a:r>
-              <a:rPr lang="de-DE" sz="1400" dirty="0" smtClean="0"/>
-              <a:t> </a:t>
-            </a:r>
-            <a:r>
-              <a:rPr lang="de-DE" sz="1400" dirty="0" err="1" smtClean="0"/>
-              <a:t>headerChange</a:t>
-            </a:r>
-            <a:r>
-              <a:rPr lang="de-DE" sz="1400" dirty="0" smtClean="0"/>
-              <a:t>()</a:t>
-            </a:r>
-          </a:p>
-          <a:p>
-            <a:pPr marL="0" indent="0">
-              <a:buNone/>
-            </a:pPr>
-            <a:r>
-              <a:rPr lang="de-DE" sz="1400" dirty="0" smtClean="0"/>
-              <a:t>		{</a:t>
-            </a:r>
-          </a:p>
-          <a:p>
-            <a:pPr marL="0" indent="0">
-              <a:buNone/>
-            </a:pPr>
-            <a:r>
-              <a:rPr lang="de-DE" sz="1400" dirty="0" smtClean="0"/>
-              <a:t>			</a:t>
-            </a:r>
-            <a:r>
-              <a:rPr lang="de-DE" sz="1400" dirty="0" err="1" smtClean="0"/>
-              <a:t>var</a:t>
-            </a:r>
-            <a:r>
-              <a:rPr lang="de-DE" sz="1400" dirty="0" smtClean="0"/>
-              <a:t> </a:t>
-            </a:r>
-            <a:r>
-              <a:rPr lang="de-DE" sz="1400" dirty="0" err="1" smtClean="0"/>
-              <a:t>img</a:t>
-            </a:r>
-            <a:r>
-              <a:rPr lang="de-DE" sz="1400" dirty="0" smtClean="0"/>
-              <a:t> = $('.</a:t>
-            </a:r>
-            <a:r>
-              <a:rPr lang="de-DE" sz="1400" dirty="0" err="1" smtClean="0"/>
-              <a:t>underheader</a:t>
-            </a:r>
-            <a:r>
-              <a:rPr lang="de-DE" sz="1400" dirty="0" smtClean="0"/>
-              <a:t> </a:t>
-            </a:r>
-            <a:r>
-              <a:rPr lang="de-DE" sz="1400" dirty="0" err="1" smtClean="0"/>
-              <a:t>img:first</a:t>
-            </a:r>
-            <a:r>
-              <a:rPr lang="de-DE" sz="1400" dirty="0" smtClean="0"/>
-              <a:t>');</a:t>
-            </a:r>
-          </a:p>
-          <a:p>
-            <a:pPr marL="0" indent="0">
-              <a:buNone/>
-            </a:pPr>
-            <a:r>
-              <a:rPr lang="de-DE" sz="1400" dirty="0" smtClean="0"/>
-              <a:t>			</a:t>
-            </a:r>
-            <a:r>
-              <a:rPr lang="de-DE" sz="1400" dirty="0" err="1" smtClean="0"/>
-              <a:t>img.hide</a:t>
-            </a:r>
-            <a:r>
-              <a:rPr lang="de-DE" sz="1400" dirty="0" smtClean="0"/>
-              <a:t>();</a:t>
-            </a:r>
-          </a:p>
-          <a:p>
-            <a:pPr marL="0" indent="0">
-              <a:buNone/>
-            </a:pPr>
-            <a:r>
-              <a:rPr lang="de-DE" sz="1400" dirty="0" smtClean="0"/>
-              <a:t>			$('.</a:t>
-            </a:r>
-            <a:r>
-              <a:rPr lang="de-DE" sz="1400" dirty="0" err="1" smtClean="0"/>
-              <a:t>underheader</a:t>
-            </a:r>
-            <a:r>
-              <a:rPr lang="de-DE" sz="1400" dirty="0" smtClean="0"/>
-              <a:t>' ).</a:t>
-            </a:r>
-            <a:r>
-              <a:rPr lang="de-DE" sz="1400" dirty="0" err="1" smtClean="0"/>
-              <a:t>append</a:t>
-            </a:r>
-            <a:r>
-              <a:rPr lang="de-DE" sz="1400" dirty="0" smtClean="0"/>
-              <a:t>(</a:t>
-            </a:r>
-            <a:r>
-              <a:rPr lang="de-DE" sz="1400" dirty="0" err="1" smtClean="0"/>
-              <a:t>img</a:t>
-            </a:r>
-            <a:r>
-              <a:rPr lang="de-DE" sz="1400" dirty="0" smtClean="0"/>
-              <a:t>);</a:t>
-            </a:r>
-          </a:p>
-          <a:p>
-            <a:pPr marL="0" indent="0">
-              <a:buNone/>
-            </a:pPr>
-            <a:r>
-              <a:rPr lang="de-DE" sz="1400" dirty="0" smtClean="0"/>
-              <a:t>			</a:t>
-            </a:r>
-            <a:r>
-              <a:rPr lang="de-DE" sz="1400" dirty="0" err="1" smtClean="0"/>
-              <a:t>img.fadeIn</a:t>
-            </a:r>
-            <a:r>
-              <a:rPr lang="de-DE" sz="1400" dirty="0" smtClean="0"/>
-              <a:t>()</a:t>
-            </a:r>
-          </a:p>
-          <a:p>
-            <a:pPr marL="0" indent="0">
-              <a:buNone/>
-            </a:pPr>
-            <a:r>
-              <a:rPr lang="de-DE" sz="1400" dirty="0" smtClean="0"/>
-              <a:t>		};</a:t>
-            </a:r>
-          </a:p>
-          <a:p>
-            <a:pPr marL="0" indent="0">
-              <a:buNone/>
-            </a:pPr>
-            <a:r>
-              <a:rPr lang="de-DE" sz="1400" dirty="0" smtClean="0"/>
-              <a:t>		//Setzt den Intervall für den Zyklus.</a:t>
-            </a:r>
-          </a:p>
-          <a:p>
-            <a:pPr marL="0" indent="0">
-              <a:buNone/>
-            </a:pPr>
-            <a:r>
-              <a:rPr lang="de-DE" sz="1400" dirty="0" smtClean="0"/>
-              <a:t>		</a:t>
-            </a:r>
-            <a:r>
-              <a:rPr lang="de-DE" sz="1400" dirty="0" err="1" smtClean="0"/>
-              <a:t>interval</a:t>
-            </a:r>
-            <a:r>
-              <a:rPr lang="de-DE" sz="1400" dirty="0" smtClean="0"/>
-              <a:t> = </a:t>
-            </a:r>
-            <a:r>
-              <a:rPr lang="de-DE" sz="1400" dirty="0" err="1" smtClean="0"/>
-              <a:t>setInterval</a:t>
-            </a:r>
-            <a:r>
-              <a:rPr lang="de-DE" sz="1400" dirty="0" smtClean="0"/>
-              <a:t>( </a:t>
-            </a:r>
-            <a:r>
-              <a:rPr lang="de-DE" sz="1400" dirty="0" err="1" smtClean="0"/>
-              <a:t>function</a:t>
-            </a:r>
-            <a:r>
-              <a:rPr lang="de-DE" sz="1400" dirty="0" smtClean="0"/>
-              <a:t>() </a:t>
-            </a:r>
-          </a:p>
-          <a:p>
-            <a:pPr marL="0" indent="0">
-              <a:buNone/>
-            </a:pPr>
-            <a:r>
-              <a:rPr lang="de-DE" sz="1400" dirty="0" smtClean="0"/>
-              <a:t>		{</a:t>
-            </a:r>
-            <a:r>
-              <a:rPr lang="de-DE" sz="1400" dirty="0" err="1" smtClean="0"/>
-              <a:t>headerChange</a:t>
-            </a:r>
-            <a:r>
-              <a:rPr lang="de-DE" sz="1400" dirty="0" smtClean="0"/>
-              <a:t>();}, 15000 );</a:t>
-            </a:r>
-          </a:p>
-          <a:p>
-            <a:pPr marL="0" indent="0">
-              <a:buNone/>
-            </a:pPr>
-            <a:r>
-              <a:rPr lang="de-DE" sz="1400" dirty="0" smtClean="0"/>
-              <a:t>	});</a:t>
-            </a:r>
-          </a:p>
-          <a:p>
-            <a:pPr marL="0" indent="0">
-              <a:buNone/>
-            </a:pPr>
-            <a:r>
-              <a:rPr lang="de-DE" sz="1400" dirty="0" smtClean="0"/>
-              <a:t>}</a:t>
-            </a:r>
-            <a:endParaRPr lang="de-DE" sz="1400" dirty="0"/>
-          </a:p>
-        </p:txBody>
-      </p:sp>
-      <p:sp>
-        <p:nvSpPr>
-          <p:cNvPr id="4" name="Inhaltsplatzhalter 3"/>
-          <p:cNvSpPr>
-            <a:spLocks noGrp="1"/>
-          </p:cNvSpPr>
-          <p:nvPr>
-            <p:ph sz="half" idx="2"/>
-          </p:nvPr>
-        </p:nvSpPr>
-        <p:spPr/>
         <p:txBody>
           <a:bodyPr>
             <a:normAutofit/>
@@ -3848,11 +4340,367 @@
           <a:p>
             <a:r>
               <a:rPr lang="de-DE" dirty="0" smtClean="0"/>
-              <a:t>Funktion zum Ändern des Hintergrundbildes im Header</a:t>
-            </a:r>
+              <a:t>Funktion zum Ändern des Hintergrundbildes </a:t>
+            </a:r>
+            <a:r>
+              <a:rPr lang="de-DE" dirty="0" smtClean="0"/>
+              <a:t>unterm Header</a:t>
+            </a:r>
+          </a:p>
+          <a:p>
+            <a:r>
+              <a:rPr lang="de-DE" dirty="0" smtClean="0"/>
+              <a:t>Benutzt „Intervall“ für einen Zyklus</a:t>
+            </a:r>
+            <a:endParaRPr lang="de-DE" dirty="0" smtClean="0"/>
           </a:p>
           <a:p>
             <a:endParaRPr lang="de-DE" dirty="0"/>
+          </a:p>
+        </p:txBody>
+      </p:sp>
+      <p:sp>
+        <p:nvSpPr>
+          <p:cNvPr id="6" name="Rechteck 5"/>
+          <p:cNvSpPr/>
+          <p:nvPr/>
+        </p:nvSpPr>
+        <p:spPr>
+          <a:xfrm>
+            <a:off x="453080" y="1690688"/>
+            <a:ext cx="6351373" cy="4524315"/>
+          </a:xfrm>
+          <a:prstGeom prst="rect">
+            <a:avLst/>
+          </a:prstGeom>
+        </p:spPr>
+        <p:txBody>
+          <a:bodyPr wrap="square">
+            <a:spAutoFit/>
+          </a:bodyPr>
+          <a:lstStyle/>
+          <a:p>
+            <a:r>
+              <a:rPr lang="de-DE" dirty="0"/>
+              <a:t>function </a:t>
+            </a:r>
+            <a:r>
+              <a:rPr lang="de-DE" dirty="0" err="1"/>
+              <a:t>headerChange</a:t>
+            </a:r>
+            <a:r>
+              <a:rPr lang="de-DE" dirty="0"/>
+              <a:t>() {</a:t>
+            </a:r>
+          </a:p>
+          <a:p>
+            <a:r>
+              <a:rPr lang="de-DE" dirty="0"/>
+              <a:t>	$(</a:t>
+            </a:r>
+            <a:r>
+              <a:rPr lang="de-DE" dirty="0" err="1"/>
+              <a:t>document</a:t>
+            </a:r>
+            <a:r>
+              <a:rPr lang="de-DE" dirty="0"/>
+              <a:t>).</a:t>
+            </a:r>
+            <a:r>
+              <a:rPr lang="de-DE" dirty="0" err="1"/>
+              <a:t>ready</a:t>
+            </a:r>
+            <a:r>
+              <a:rPr lang="de-DE" dirty="0"/>
+              <a:t>(</a:t>
+            </a:r>
+            <a:r>
+              <a:rPr lang="de-DE" dirty="0" err="1"/>
+              <a:t>function</a:t>
+            </a:r>
+            <a:r>
+              <a:rPr lang="de-DE" dirty="0"/>
+              <a:t>(){</a:t>
+            </a:r>
+          </a:p>
+          <a:p>
+            <a:r>
+              <a:rPr lang="de-DE" dirty="0"/>
+              <a:t>		</a:t>
+            </a:r>
+            <a:r>
+              <a:rPr lang="de-DE" dirty="0" err="1">
+                <a:solidFill>
+                  <a:srgbClr val="FF0000"/>
+                </a:solidFill>
+              </a:rPr>
+              <a:t>var</a:t>
+            </a:r>
+            <a:r>
+              <a:rPr lang="de-DE" dirty="0"/>
+              <a:t> </a:t>
+            </a:r>
+            <a:r>
+              <a:rPr lang="de-DE" dirty="0" err="1">
+                <a:solidFill>
+                  <a:srgbClr val="7030A0"/>
+                </a:solidFill>
+              </a:rPr>
+              <a:t>interval</a:t>
+            </a:r>
+            <a:r>
+              <a:rPr lang="de-DE" dirty="0"/>
+              <a:t>;</a:t>
+            </a:r>
+          </a:p>
+          <a:p>
+            <a:r>
+              <a:rPr lang="de-DE" dirty="0">
+                <a:solidFill>
+                  <a:schemeClr val="tx1">
+                    <a:lumMod val="50000"/>
+                    <a:lumOff val="50000"/>
+                  </a:schemeClr>
+                </a:solidFill>
+              </a:rPr>
+              <a:t>		//Zirkelt durch die vorhandenen Bilder.</a:t>
+            </a:r>
+          </a:p>
+          <a:p>
+            <a:r>
+              <a:rPr lang="de-DE" dirty="0"/>
+              <a:t>		function </a:t>
+            </a:r>
+            <a:r>
+              <a:rPr lang="de-DE" dirty="0" err="1" smtClean="0"/>
+              <a:t>headerChangeF</a:t>
+            </a:r>
+            <a:r>
+              <a:rPr lang="de-DE" dirty="0" smtClean="0"/>
+              <a:t>()</a:t>
+            </a:r>
+            <a:endParaRPr lang="de-DE" dirty="0"/>
+          </a:p>
+          <a:p>
+            <a:r>
+              <a:rPr lang="de-DE" dirty="0"/>
+              <a:t>		{</a:t>
+            </a:r>
+          </a:p>
+          <a:p>
+            <a:r>
+              <a:rPr lang="de-DE" dirty="0"/>
+              <a:t>			</a:t>
+            </a:r>
+            <a:r>
+              <a:rPr lang="de-DE" dirty="0" err="1">
+                <a:solidFill>
+                  <a:srgbClr val="FF0000"/>
+                </a:solidFill>
+              </a:rPr>
+              <a:t>var</a:t>
+            </a:r>
+            <a:r>
+              <a:rPr lang="de-DE" dirty="0"/>
+              <a:t> </a:t>
+            </a:r>
+            <a:r>
+              <a:rPr lang="de-DE" dirty="0" err="1">
+                <a:solidFill>
+                  <a:srgbClr val="00B050"/>
+                </a:solidFill>
+              </a:rPr>
+              <a:t>img</a:t>
+            </a:r>
+            <a:r>
+              <a:rPr lang="de-DE" dirty="0">
+                <a:solidFill>
+                  <a:srgbClr val="00B050"/>
+                </a:solidFill>
+              </a:rPr>
+              <a:t> </a:t>
+            </a:r>
+            <a:r>
+              <a:rPr lang="de-DE" dirty="0"/>
+              <a:t>= $('.</a:t>
+            </a:r>
+            <a:r>
+              <a:rPr lang="de-DE" dirty="0" err="1"/>
+              <a:t>underheader</a:t>
+            </a:r>
+            <a:r>
+              <a:rPr lang="de-DE" dirty="0"/>
+              <a:t> </a:t>
+            </a:r>
+            <a:r>
+              <a:rPr lang="de-DE" dirty="0" err="1"/>
+              <a:t>img:first</a:t>
+            </a:r>
+            <a:r>
+              <a:rPr lang="de-DE" dirty="0"/>
+              <a:t>');</a:t>
+            </a:r>
+          </a:p>
+          <a:p>
+            <a:r>
+              <a:rPr lang="de-DE" dirty="0"/>
+              <a:t>			</a:t>
+            </a:r>
+            <a:r>
+              <a:rPr lang="de-DE" dirty="0" err="1">
+                <a:solidFill>
+                  <a:srgbClr val="00B050"/>
+                </a:solidFill>
+              </a:rPr>
+              <a:t>img</a:t>
+            </a:r>
+            <a:r>
+              <a:rPr lang="de-DE" dirty="0" err="1"/>
+              <a:t>.hide</a:t>
+            </a:r>
+            <a:r>
+              <a:rPr lang="de-DE" dirty="0"/>
+              <a:t>();</a:t>
+            </a:r>
+          </a:p>
+          <a:p>
+            <a:r>
+              <a:rPr lang="de-DE" dirty="0"/>
+              <a:t>			$('.</a:t>
+            </a:r>
+            <a:r>
+              <a:rPr lang="de-DE" dirty="0" err="1"/>
+              <a:t>underheader</a:t>
+            </a:r>
+            <a:r>
+              <a:rPr lang="de-DE" dirty="0"/>
+              <a:t>' ).</a:t>
+            </a:r>
+            <a:r>
+              <a:rPr lang="de-DE" dirty="0" err="1"/>
+              <a:t>append</a:t>
+            </a:r>
+            <a:r>
+              <a:rPr lang="de-DE" dirty="0"/>
+              <a:t>(</a:t>
+            </a:r>
+            <a:r>
+              <a:rPr lang="de-DE" dirty="0" err="1">
+                <a:solidFill>
+                  <a:srgbClr val="00B050"/>
+                </a:solidFill>
+              </a:rPr>
+              <a:t>img</a:t>
+            </a:r>
+            <a:r>
+              <a:rPr lang="de-DE" dirty="0"/>
+              <a:t>);</a:t>
+            </a:r>
+          </a:p>
+          <a:p>
+            <a:r>
+              <a:rPr lang="de-DE" dirty="0"/>
+              <a:t>			</a:t>
+            </a:r>
+            <a:r>
+              <a:rPr lang="de-DE" dirty="0" err="1">
+                <a:solidFill>
+                  <a:srgbClr val="00B050"/>
+                </a:solidFill>
+              </a:rPr>
+              <a:t>img</a:t>
+            </a:r>
+            <a:r>
+              <a:rPr lang="de-DE" dirty="0" err="1"/>
+              <a:t>.fadeIn</a:t>
+            </a:r>
+            <a:r>
+              <a:rPr lang="de-DE" dirty="0"/>
+              <a:t>()</a:t>
+            </a:r>
+          </a:p>
+          <a:p>
+            <a:r>
+              <a:rPr lang="de-DE" dirty="0"/>
+              <a:t>		};</a:t>
+            </a:r>
+          </a:p>
+          <a:p>
+            <a:r>
+              <a:rPr lang="de-DE" dirty="0">
+                <a:solidFill>
+                  <a:schemeClr val="tx1">
+                    <a:lumMod val="50000"/>
+                    <a:lumOff val="50000"/>
+                  </a:schemeClr>
+                </a:solidFill>
+              </a:rPr>
+              <a:t>		//Setzt den Intervall für den Zyklus.</a:t>
+            </a:r>
+          </a:p>
+          <a:p>
+            <a:r>
+              <a:rPr lang="de-DE" dirty="0"/>
+              <a:t>		</a:t>
+            </a:r>
+            <a:r>
+              <a:rPr lang="de-DE" dirty="0" err="1">
+                <a:solidFill>
+                  <a:srgbClr val="7030A0"/>
+                </a:solidFill>
+              </a:rPr>
+              <a:t>interval</a:t>
+            </a:r>
+            <a:r>
+              <a:rPr lang="de-DE" dirty="0">
+                <a:solidFill>
+                  <a:srgbClr val="7030A0"/>
+                </a:solidFill>
+              </a:rPr>
+              <a:t> </a:t>
+            </a:r>
+            <a:r>
+              <a:rPr lang="de-DE" dirty="0"/>
+              <a:t>= </a:t>
+            </a:r>
+            <a:r>
+              <a:rPr lang="de-DE" dirty="0" err="1"/>
+              <a:t>setInterval</a:t>
+            </a:r>
+            <a:r>
+              <a:rPr lang="de-DE" dirty="0"/>
+              <a:t>( function() </a:t>
+            </a:r>
+          </a:p>
+          <a:p>
+            <a:r>
+              <a:rPr lang="de-DE" dirty="0"/>
+              <a:t>		{</a:t>
+            </a:r>
+            <a:r>
+              <a:rPr lang="de-DE" dirty="0" err="1" smtClean="0"/>
+              <a:t>headerChangeF</a:t>
+            </a:r>
+            <a:r>
+              <a:rPr lang="de-DE" dirty="0" smtClean="0"/>
+              <a:t>();}, </a:t>
+            </a:r>
+            <a:r>
+              <a:rPr lang="de-DE" dirty="0"/>
+              <a:t>15000 );</a:t>
+            </a:r>
+          </a:p>
+          <a:p>
+            <a:r>
+              <a:rPr lang="de-DE" dirty="0"/>
+              <a:t>	});</a:t>
+            </a:r>
+          </a:p>
+          <a:p>
+            <a:r>
+              <a:rPr lang="de-DE" dirty="0"/>
+              <a:t>}</a:t>
+            </a:r>
           </a:p>
         </p:txBody>
       </p:sp>
@@ -3911,25 +4759,6 @@
       </p:sp>
       <p:sp>
         <p:nvSpPr>
-          <p:cNvPr id="3" name="Inhaltsplatzhalter 2"/>
-          <p:cNvSpPr>
-            <a:spLocks noGrp="1"/>
-          </p:cNvSpPr>
-          <p:nvPr>
-            <p:ph sz="half" idx="1"/>
-          </p:nvPr>
-        </p:nvSpPr>
-        <p:spPr/>
-        <p:txBody>
-          <a:bodyPr/>
-          <a:lstStyle/>
-          <a:p>
-            <a:endParaRPr lang="de-DE"/>
-          </a:p>
-        </p:txBody>
-      </p:sp>
-      <p:sp>
-        <p:nvSpPr>
           <p:cNvPr id="4" name="Inhaltsplatzhalter 3"/>
           <p:cNvSpPr>
             <a:spLocks noGrp="1"/>
@@ -3938,12 +4767,622 @@
             <p:ph sz="half" idx="2"/>
           </p:nvPr>
         </p:nvSpPr>
-        <p:spPr/>
-        <p:txBody>
-          <a:bodyPr/>
-          <a:lstStyle/>
-          <a:p>
-            <a:endParaRPr lang="de-DE"/>
+        <p:spPr>
+          <a:xfrm>
+            <a:off x="4318686" y="297764"/>
+            <a:ext cx="7683843" cy="1325563"/>
+          </a:xfrm>
+        </p:spPr>
+        <p:txBody>
+          <a:bodyPr>
+            <a:normAutofit lnSpcReduction="10000"/>
+          </a:bodyPr>
+          <a:lstStyle/>
+          <a:p>
+            <a:r>
+              <a:rPr lang="de-DE" dirty="0" smtClean="0"/>
+              <a:t>Link zur aktuellen Seite wird Orange unterstrichen</a:t>
+            </a:r>
+          </a:p>
+          <a:p>
+            <a:r>
+              <a:rPr lang="de-DE" dirty="0" smtClean="0"/>
+              <a:t>Benutzt „Title“ </a:t>
+            </a:r>
+            <a:r>
+              <a:rPr lang="de-DE" dirty="0" smtClean="0"/>
+              <a:t>des Dokuments um zu Üb</a:t>
+            </a:r>
+            <a:r>
+              <a:rPr lang="de-DE" dirty="0" smtClean="0"/>
+              <a:t>erprüfen, auf welcher Seite man sich befindet</a:t>
+            </a:r>
+            <a:endParaRPr lang="de-DE" dirty="0"/>
+          </a:p>
+        </p:txBody>
+      </p:sp>
+      <p:sp>
+        <p:nvSpPr>
+          <p:cNvPr id="5" name="Rechteck 4"/>
+          <p:cNvSpPr/>
+          <p:nvPr/>
+        </p:nvSpPr>
+        <p:spPr>
+          <a:xfrm>
+            <a:off x="508686" y="1534169"/>
+            <a:ext cx="10002795" cy="5262979"/>
+          </a:xfrm>
+          <a:prstGeom prst="rect">
+            <a:avLst/>
+          </a:prstGeom>
+        </p:spPr>
+        <p:txBody>
+          <a:bodyPr wrap="square">
+            <a:spAutoFit/>
+          </a:bodyPr>
+          <a:lstStyle/>
+          <a:p>
+            <a:r>
+              <a:rPr lang="de-DE" sz="1600" dirty="0"/>
+              <a:t>function </a:t>
+            </a:r>
+            <a:r>
+              <a:rPr lang="de-DE" sz="1600" dirty="0" err="1"/>
+              <a:t>headerLink</a:t>
+            </a:r>
+            <a:r>
+              <a:rPr lang="de-DE" sz="1600" dirty="0"/>
+              <a:t>(){</a:t>
+            </a:r>
+          </a:p>
+          <a:p>
+            <a:r>
+              <a:rPr lang="de-DE" sz="1600" dirty="0"/>
+              <a:t>	$(</a:t>
+            </a:r>
+            <a:r>
+              <a:rPr lang="de-DE" sz="1600" dirty="0" err="1"/>
+              <a:t>document</a:t>
+            </a:r>
+            <a:r>
+              <a:rPr lang="de-DE" sz="1600" dirty="0"/>
+              <a:t>).</a:t>
+            </a:r>
+            <a:r>
+              <a:rPr lang="de-DE" sz="1600" dirty="0" err="1"/>
+              <a:t>ready</a:t>
+            </a:r>
+            <a:r>
+              <a:rPr lang="de-DE" sz="1600" dirty="0"/>
+              <a:t>(function(){	</a:t>
+            </a:r>
+          </a:p>
+          <a:p>
+            <a:r>
+              <a:rPr lang="de-DE" sz="1600" dirty="0">
+                <a:solidFill>
+                  <a:schemeClr val="tx1">
+                    <a:lumMod val="50000"/>
+                    <a:lumOff val="50000"/>
+                  </a:schemeClr>
+                </a:solidFill>
+              </a:rPr>
+              <a:t>		//Fasst alle Links in eine Liste "</a:t>
+            </a:r>
+            <a:r>
+              <a:rPr lang="de-DE" sz="1600" dirty="0" err="1">
+                <a:solidFill>
+                  <a:schemeClr val="tx1">
+                    <a:lumMod val="50000"/>
+                    <a:lumOff val="50000"/>
+                  </a:schemeClr>
+                </a:solidFill>
+              </a:rPr>
+              <a:t>linklist</a:t>
+            </a:r>
+            <a:r>
+              <a:rPr lang="de-DE" sz="1600" dirty="0">
+                <a:solidFill>
+                  <a:schemeClr val="tx1">
+                    <a:lumMod val="50000"/>
+                    <a:lumOff val="50000"/>
+                  </a:schemeClr>
+                </a:solidFill>
+              </a:rPr>
+              <a:t>" zusammen. Erstellt auch die leere Variable "</a:t>
+            </a:r>
+            <a:r>
+              <a:rPr lang="de-DE" sz="1600" dirty="0" err="1">
+                <a:solidFill>
+                  <a:schemeClr val="tx1">
+                    <a:lumMod val="50000"/>
+                    <a:lumOff val="50000"/>
+                  </a:schemeClr>
+                </a:solidFill>
+              </a:rPr>
+              <a:t>currentlink</a:t>
+            </a:r>
+            <a:r>
+              <a:rPr lang="de-DE" sz="1600" dirty="0">
+                <a:solidFill>
+                  <a:schemeClr val="tx1">
+                    <a:lumMod val="50000"/>
+                    <a:lumOff val="50000"/>
+                  </a:schemeClr>
+                </a:solidFill>
+              </a:rPr>
+              <a:t>".</a:t>
+            </a:r>
+          </a:p>
+          <a:p>
+            <a:r>
+              <a:rPr lang="de-DE" sz="1600" dirty="0"/>
+              <a:t>		</a:t>
+            </a:r>
+            <a:r>
+              <a:rPr lang="de-DE" sz="1600" dirty="0" err="1">
+                <a:solidFill>
+                  <a:srgbClr val="FF0000"/>
+                </a:solidFill>
+              </a:rPr>
+              <a:t>var</a:t>
+            </a:r>
+            <a:r>
+              <a:rPr lang="de-DE" sz="1600" dirty="0">
+                <a:solidFill>
+                  <a:srgbClr val="FF0000"/>
+                </a:solidFill>
+              </a:rPr>
+              <a:t> </a:t>
+            </a:r>
+            <a:r>
+              <a:rPr lang="de-DE" sz="1600" dirty="0" err="1">
+                <a:solidFill>
+                  <a:srgbClr val="92D050"/>
+                </a:solidFill>
+              </a:rPr>
+              <a:t>linklist</a:t>
+            </a:r>
+            <a:r>
+              <a:rPr lang="de-DE" sz="1600" dirty="0">
+                <a:solidFill>
+                  <a:srgbClr val="92D050"/>
+                </a:solidFill>
+              </a:rPr>
+              <a:t> </a:t>
+            </a:r>
+            <a:r>
+              <a:rPr lang="de-DE" sz="1600" dirty="0"/>
+              <a:t>= </a:t>
+            </a:r>
+            <a:r>
+              <a:rPr lang="de-DE" sz="1600" dirty="0" err="1"/>
+              <a:t>document.getElementsByClassName</a:t>
+            </a:r>
+            <a:r>
+              <a:rPr lang="de-DE" sz="1600" dirty="0"/>
+              <a:t>("</a:t>
+            </a:r>
+            <a:r>
+              <a:rPr lang="de-DE" sz="1600" dirty="0" err="1"/>
+              <a:t>hlink</a:t>
+            </a:r>
+            <a:r>
+              <a:rPr lang="de-DE" sz="1600" dirty="0"/>
+              <a:t>");</a:t>
+            </a:r>
+          </a:p>
+          <a:p>
+            <a:r>
+              <a:rPr lang="de-DE" sz="1600" dirty="0"/>
+              <a:t>		</a:t>
+            </a:r>
+            <a:r>
+              <a:rPr lang="de-DE" sz="1600" dirty="0" err="1">
+                <a:solidFill>
+                  <a:srgbClr val="FF0000"/>
+                </a:solidFill>
+              </a:rPr>
+              <a:t>var</a:t>
+            </a:r>
+            <a:r>
+              <a:rPr lang="de-DE" sz="1600" dirty="0">
+                <a:solidFill>
+                  <a:srgbClr val="FF0000"/>
+                </a:solidFill>
+              </a:rPr>
+              <a:t> </a:t>
+            </a:r>
+            <a:r>
+              <a:rPr lang="de-DE" sz="1600" dirty="0" err="1">
+                <a:solidFill>
+                  <a:srgbClr val="7030A0"/>
+                </a:solidFill>
+              </a:rPr>
+              <a:t>currentlink</a:t>
+            </a:r>
+            <a:r>
+              <a:rPr lang="de-DE" sz="1600" dirty="0"/>
+              <a:t> = null;</a:t>
+            </a:r>
+          </a:p>
+          <a:p>
+            <a:r>
+              <a:rPr lang="de-DE" sz="1600" dirty="0">
+                <a:solidFill>
+                  <a:schemeClr val="tx1">
+                    <a:lumMod val="50000"/>
+                    <a:lumOff val="50000"/>
+                  </a:schemeClr>
+                </a:solidFill>
+              </a:rPr>
+              <a:t>		//Überprüft den "title" des Dokuments. Basierend darauf wird "</a:t>
+            </a:r>
+            <a:r>
+              <a:rPr lang="de-DE" sz="1600" dirty="0" err="1">
+                <a:solidFill>
+                  <a:schemeClr val="tx1">
+                    <a:lumMod val="50000"/>
+                    <a:lumOff val="50000"/>
+                  </a:schemeClr>
+                </a:solidFill>
+              </a:rPr>
+              <a:t>currentlink</a:t>
+            </a:r>
+            <a:r>
+              <a:rPr lang="de-DE" sz="1600" dirty="0">
+                <a:solidFill>
+                  <a:schemeClr val="tx1">
+                    <a:lumMod val="50000"/>
+                    <a:lumOff val="50000"/>
+                  </a:schemeClr>
+                </a:solidFill>
+              </a:rPr>
+              <a:t>" auf einen der Links aus "</a:t>
+            </a:r>
+            <a:r>
+              <a:rPr lang="de-DE" sz="1600" dirty="0" err="1">
+                <a:solidFill>
+                  <a:schemeClr val="tx1">
+                    <a:lumMod val="50000"/>
+                    <a:lumOff val="50000"/>
+                  </a:schemeClr>
+                </a:solidFill>
+              </a:rPr>
+              <a:t>linklist</a:t>
+            </a:r>
+            <a:r>
+              <a:rPr lang="de-DE" sz="1600" dirty="0">
+                <a:solidFill>
+                  <a:schemeClr val="tx1">
+                    <a:lumMod val="50000"/>
+                    <a:lumOff val="50000"/>
+                  </a:schemeClr>
+                </a:solidFill>
+              </a:rPr>
+              <a:t>" gesetzt.</a:t>
+            </a:r>
+          </a:p>
+          <a:p>
+            <a:r>
+              <a:rPr lang="de-DE" sz="1600" dirty="0"/>
+              <a:t>		</a:t>
+            </a:r>
+            <a:r>
+              <a:rPr lang="de-DE" sz="1600" dirty="0" err="1"/>
+              <a:t>switch</a:t>
+            </a:r>
+            <a:r>
+              <a:rPr lang="de-DE" sz="1600" dirty="0"/>
+              <a:t>(</a:t>
+            </a:r>
+            <a:r>
+              <a:rPr lang="de-DE" sz="1600" dirty="0" err="1"/>
+              <a:t>document.title</a:t>
+            </a:r>
+            <a:r>
+              <a:rPr lang="de-DE" sz="1600" dirty="0"/>
+              <a:t>) {</a:t>
+            </a:r>
+          </a:p>
+          <a:p>
+            <a:r>
+              <a:rPr lang="de-DE" sz="1600" dirty="0"/>
+              <a:t>			</a:t>
+            </a:r>
+            <a:r>
+              <a:rPr lang="de-DE" sz="1600" dirty="0" err="1"/>
+              <a:t>case</a:t>
+            </a:r>
+            <a:r>
+              <a:rPr lang="de-DE" sz="1600" dirty="0"/>
+              <a:t> "Start - Natur- und Heimatverein </a:t>
+            </a:r>
+            <a:r>
+              <a:rPr lang="de-DE" sz="1600" dirty="0" err="1"/>
+              <a:t>Lüllingen</a:t>
+            </a:r>
+            <a:r>
+              <a:rPr lang="de-DE" sz="1600" dirty="0"/>
+              <a:t>":</a:t>
+            </a:r>
+          </a:p>
+          <a:p>
+            <a:r>
+              <a:rPr lang="de-DE" sz="1600" dirty="0"/>
+              <a:t>				</a:t>
+            </a:r>
+            <a:r>
+              <a:rPr lang="de-DE" sz="1600" dirty="0" err="1">
+                <a:solidFill>
+                  <a:srgbClr val="7030A0"/>
+                </a:solidFill>
+              </a:rPr>
+              <a:t>currentlink</a:t>
+            </a:r>
+            <a:r>
+              <a:rPr lang="de-DE" sz="1600" dirty="0"/>
+              <a:t> = </a:t>
+            </a:r>
+            <a:r>
+              <a:rPr lang="de-DE" sz="1600" dirty="0" err="1">
+                <a:solidFill>
+                  <a:srgbClr val="92D050"/>
+                </a:solidFill>
+              </a:rPr>
+              <a:t>linklist</a:t>
+            </a:r>
+            <a:r>
+              <a:rPr lang="de-DE" sz="1600" dirty="0"/>
+              <a:t>[0]</a:t>
+            </a:r>
+          </a:p>
+          <a:p>
+            <a:r>
+              <a:rPr lang="de-DE" sz="1600" dirty="0"/>
+              <a:t>				break</a:t>
+            </a:r>
+          </a:p>
+          <a:p>
+            <a:r>
+              <a:rPr lang="de-DE" sz="1600" dirty="0"/>
+              <a:t>			</a:t>
+            </a:r>
+            <a:r>
+              <a:rPr lang="de-DE" sz="1600" dirty="0" err="1"/>
+              <a:t>case</a:t>
+            </a:r>
+            <a:r>
+              <a:rPr lang="de-DE" sz="1600" dirty="0"/>
+              <a:t> "News - Natur- und Heimatverein </a:t>
+            </a:r>
+            <a:r>
+              <a:rPr lang="de-DE" sz="1600" dirty="0" err="1"/>
+              <a:t>Lüllingen</a:t>
+            </a:r>
+            <a:r>
+              <a:rPr lang="de-DE" sz="1600" dirty="0"/>
+              <a:t>":</a:t>
+            </a:r>
+          </a:p>
+          <a:p>
+            <a:r>
+              <a:rPr lang="de-DE" sz="1600" dirty="0"/>
+              <a:t>				</a:t>
+            </a:r>
+            <a:r>
+              <a:rPr lang="de-DE" sz="1600" dirty="0" err="1">
+                <a:solidFill>
+                  <a:srgbClr val="7030A0"/>
+                </a:solidFill>
+              </a:rPr>
+              <a:t>currentlink</a:t>
+            </a:r>
+            <a:r>
+              <a:rPr lang="de-DE" sz="1600" dirty="0"/>
+              <a:t> = </a:t>
+            </a:r>
+            <a:r>
+              <a:rPr lang="de-DE" sz="1600" dirty="0" err="1">
+                <a:solidFill>
+                  <a:srgbClr val="92D050"/>
+                </a:solidFill>
+              </a:rPr>
+              <a:t>linklist</a:t>
+            </a:r>
+            <a:r>
+              <a:rPr lang="de-DE" sz="1600" dirty="0"/>
+              <a:t>[1]</a:t>
+            </a:r>
+          </a:p>
+          <a:p>
+            <a:r>
+              <a:rPr lang="de-DE" sz="1600" dirty="0"/>
+              <a:t>				</a:t>
+            </a:r>
+            <a:r>
+              <a:rPr lang="de-DE" sz="1600" dirty="0" smtClean="0"/>
+              <a:t>break;</a:t>
+            </a:r>
+          </a:p>
+          <a:p>
+            <a:r>
+              <a:rPr lang="de-DE" sz="1600" dirty="0"/>
+              <a:t>		}</a:t>
+            </a:r>
+          </a:p>
+          <a:p>
+            <a:r>
+              <a:rPr lang="de-DE" sz="1600" dirty="0">
+                <a:solidFill>
+                  <a:schemeClr val="tx1">
+                    <a:lumMod val="50000"/>
+                    <a:lumOff val="50000"/>
+                  </a:schemeClr>
+                </a:solidFill>
+              </a:rPr>
+              <a:t>		//Weist dem "</a:t>
+            </a:r>
+            <a:r>
+              <a:rPr lang="de-DE" sz="1600" dirty="0" err="1">
+                <a:solidFill>
+                  <a:schemeClr val="tx1">
+                    <a:lumMod val="50000"/>
+                    <a:lumOff val="50000"/>
+                  </a:schemeClr>
+                </a:solidFill>
+              </a:rPr>
+              <a:t>currentlink</a:t>
+            </a:r>
+            <a:r>
+              <a:rPr lang="de-DE" sz="1600" dirty="0">
+                <a:solidFill>
+                  <a:schemeClr val="tx1">
+                    <a:lumMod val="50000"/>
+                    <a:lumOff val="50000"/>
+                  </a:schemeClr>
+                </a:solidFill>
+              </a:rPr>
+              <a:t>" die nötigen CSS Elemente zu, damit er unterstrichen erscheint.</a:t>
+            </a:r>
+          </a:p>
+          <a:p>
+            <a:r>
+              <a:rPr lang="de-DE" sz="1600" dirty="0"/>
+              <a:t>		$(</a:t>
+            </a:r>
+            <a:r>
+              <a:rPr lang="de-DE" sz="1600" dirty="0" err="1">
+                <a:solidFill>
+                  <a:srgbClr val="7030A0"/>
+                </a:solidFill>
+              </a:rPr>
+              <a:t>currentlink</a:t>
+            </a:r>
+            <a:r>
+              <a:rPr lang="de-DE" sz="1600" dirty="0"/>
+              <a:t>).</a:t>
+            </a:r>
+            <a:r>
+              <a:rPr lang="de-DE" sz="1600" dirty="0" err="1"/>
+              <a:t>css</a:t>
+            </a:r>
+            <a:r>
+              <a:rPr lang="de-DE" sz="1600" dirty="0"/>
+              <a:t>( "</a:t>
+            </a:r>
+            <a:r>
+              <a:rPr lang="de-DE" sz="1600" dirty="0" err="1"/>
+              <a:t>border-bottom-width</a:t>
+            </a:r>
+            <a:r>
+              <a:rPr lang="de-DE" sz="1600" dirty="0"/>
+              <a:t>", "3px")</a:t>
+            </a:r>
+          </a:p>
+          <a:p>
+            <a:r>
+              <a:rPr lang="de-DE" sz="1600" dirty="0"/>
+              <a:t>		$(</a:t>
+            </a:r>
+            <a:r>
+              <a:rPr lang="de-DE" sz="1600" dirty="0" err="1">
+                <a:solidFill>
+                  <a:srgbClr val="7030A0"/>
+                </a:solidFill>
+              </a:rPr>
+              <a:t>currentlink</a:t>
+            </a:r>
+            <a:r>
+              <a:rPr lang="de-DE" sz="1600" dirty="0"/>
+              <a:t>).</a:t>
+            </a:r>
+            <a:r>
+              <a:rPr lang="de-DE" sz="1600" dirty="0" err="1"/>
+              <a:t>css</a:t>
+            </a:r>
+            <a:r>
+              <a:rPr lang="de-DE" sz="1600" dirty="0"/>
+              <a:t>( "</a:t>
+            </a:r>
+            <a:r>
+              <a:rPr lang="de-DE" sz="1600" dirty="0" err="1"/>
+              <a:t>border</a:t>
+            </a:r>
+            <a:r>
+              <a:rPr lang="de-DE" sz="1600" dirty="0"/>
+              <a:t>-</a:t>
+            </a:r>
+            <a:r>
+              <a:rPr lang="de-DE" sz="1600" dirty="0" err="1"/>
+              <a:t>bottom</a:t>
+            </a:r>
+            <a:r>
+              <a:rPr lang="de-DE" sz="1600" dirty="0"/>
+              <a:t>-style", "solid")</a:t>
+            </a:r>
+          </a:p>
+          <a:p>
+            <a:r>
+              <a:rPr lang="de-DE" sz="1600" dirty="0"/>
+              <a:t>		$(</a:t>
+            </a:r>
+            <a:r>
+              <a:rPr lang="de-DE" sz="1600" dirty="0" err="1">
+                <a:solidFill>
+                  <a:srgbClr val="7030A0"/>
+                </a:solidFill>
+              </a:rPr>
+              <a:t>currentlink</a:t>
+            </a:r>
+            <a:r>
+              <a:rPr lang="de-DE" sz="1600" dirty="0"/>
+              <a:t>).</a:t>
+            </a:r>
+            <a:r>
+              <a:rPr lang="de-DE" sz="1600" dirty="0" err="1"/>
+              <a:t>css</a:t>
+            </a:r>
+            <a:r>
+              <a:rPr lang="de-DE" sz="1600" dirty="0"/>
+              <a:t>( "</a:t>
+            </a:r>
+            <a:r>
+              <a:rPr lang="de-DE" sz="1600" dirty="0" err="1"/>
+              <a:t>border</a:t>
+            </a:r>
+            <a:r>
+              <a:rPr lang="de-DE" sz="1600" dirty="0"/>
+              <a:t>-</a:t>
+            </a:r>
+            <a:r>
+              <a:rPr lang="de-DE" sz="1600" dirty="0" err="1"/>
+              <a:t>bottom</a:t>
+            </a:r>
+            <a:r>
+              <a:rPr lang="de-DE" sz="1600" dirty="0"/>
+              <a:t>-color", "</a:t>
+            </a:r>
+            <a:r>
+              <a:rPr lang="de-DE" sz="1600" dirty="0" err="1"/>
+              <a:t>rgb</a:t>
+            </a:r>
+            <a:r>
+              <a:rPr lang="de-DE" sz="1600" dirty="0"/>
+              <a:t>(252,173,24)")</a:t>
+            </a:r>
+          </a:p>
+          <a:p>
+            <a:r>
+              <a:rPr lang="de-DE" sz="1600" dirty="0"/>
+              <a:t>	});</a:t>
+            </a:r>
+          </a:p>
+          <a:p>
+            <a:r>
+              <a:rPr lang="de-DE" sz="1600" dirty="0"/>
+              <a:t>}</a:t>
+            </a:r>
           </a:p>
         </p:txBody>
       </p:sp>
@@ -4002,194 +5441,18 @@
       </p:sp>
       <p:sp>
         <p:nvSpPr>
-          <p:cNvPr id="3" name="Inhaltsplatzhalter 2"/>
-          <p:cNvSpPr>
-            <a:spLocks noGrp="1"/>
-          </p:cNvSpPr>
-          <p:nvPr>
-            <p:ph sz="half" idx="1"/>
+          <p:cNvPr id="4" name="Inhaltsplatzhalter 3"/>
+          <p:cNvSpPr>
+            <a:spLocks noGrp="1"/>
+          </p:cNvSpPr>
+          <p:nvPr>
+            <p:ph sz="half" idx="2"/>
           </p:nvPr>
         </p:nvSpPr>
         <p:spPr>
           <a:xfrm>
-            <a:off x="345440" y="1825624"/>
-            <a:ext cx="5674360" cy="5032375"/>
-          </a:xfrm>
-        </p:spPr>
-        <p:txBody>
-          <a:bodyPr>
-            <a:noAutofit/>
-          </a:bodyPr>
-          <a:lstStyle/>
-          <a:p>
-            <a:pPr marL="0" indent="0">
-              <a:buNone/>
-            </a:pPr>
-            <a:r>
-              <a:rPr lang="de-DE" sz="1400" dirty="0" smtClean="0"/>
-              <a:t>{</a:t>
-            </a:r>
-          </a:p>
-          <a:p>
-            <a:pPr marL="0" indent="0">
-              <a:buNone/>
-            </a:pPr>
-            <a:r>
-              <a:rPr lang="de-DE" sz="1400" dirty="0"/>
-              <a:t> </a:t>
-            </a:r>
-            <a:r>
-              <a:rPr lang="de-DE" sz="1400" dirty="0" smtClean="0"/>
-              <a:t>      "</a:t>
-            </a:r>
-            <a:r>
-              <a:rPr lang="de-DE" sz="1400" dirty="0" err="1" smtClean="0"/>
-              <a:t>termine</a:t>
-            </a:r>
-            <a:r>
-              <a:rPr lang="de-DE" sz="1400" dirty="0" smtClean="0"/>
-              <a:t>" : </a:t>
-            </a:r>
-          </a:p>
-          <a:p>
-            <a:pPr marL="0" indent="0">
-              <a:buNone/>
-            </a:pPr>
-            <a:r>
-              <a:rPr lang="de-DE" sz="1400" dirty="0"/>
-              <a:t>	</a:t>
-            </a:r>
-            <a:r>
-              <a:rPr lang="de-DE" sz="1400" dirty="0" smtClean="0"/>
-              <a:t>[</a:t>
-            </a:r>
-          </a:p>
-          <a:p>
-            <a:pPr marL="0" indent="0">
-              <a:buNone/>
-            </a:pPr>
-            <a:r>
-              <a:rPr lang="de-DE" sz="1400" dirty="0"/>
-              <a:t>	</a:t>
-            </a:r>
-            <a:r>
-              <a:rPr lang="de-DE" sz="1400" dirty="0" smtClean="0"/>
-              <a:t>  </a:t>
-            </a:r>
-            <a:r>
-              <a:rPr lang="de-DE" sz="1400" dirty="0" smtClean="0"/>
-              <a:t>["09.02.2016","Seniorennachmittag","Jugendheim"],</a:t>
-            </a:r>
-          </a:p>
-          <a:p>
-            <a:pPr marL="0" indent="0">
-              <a:buNone/>
-            </a:pPr>
-            <a:r>
-              <a:rPr lang="de-DE" sz="1400" dirty="0" smtClean="0"/>
-              <a:t>	  ["10.02.2016","Wortgottesdienst zu Aschermittwoch", 	 	  "Kirche"],</a:t>
-            </a:r>
-          </a:p>
-          <a:p>
-            <a:pPr marL="0" indent="0">
-              <a:buNone/>
-            </a:pPr>
-            <a:r>
-              <a:rPr lang="de-DE" sz="1400" dirty="0" smtClean="0"/>
-              <a:t>	  ["14.02.2016","Familiengottesdienst","Kirche"],</a:t>
-            </a:r>
-          </a:p>
-          <a:p>
-            <a:pPr marL="0" indent="0">
-              <a:buNone/>
-            </a:pPr>
-            <a:r>
-              <a:rPr lang="de-DE" sz="1400" dirty="0" smtClean="0"/>
-              <a:t>	  ["15.02.2016","Gemeindeversammlung","Pfarrheim 	 	  Geldern"],</a:t>
-            </a:r>
-          </a:p>
-          <a:p>
-            <a:pPr marL="0" indent="0">
-              <a:buNone/>
-            </a:pPr>
-            <a:r>
-              <a:rPr lang="de-DE" sz="1400" dirty="0" smtClean="0"/>
-              <a:t>	  ["18.02.2016","Einkehrtag in </a:t>
-            </a:r>
-            <a:r>
-              <a:rPr lang="de-DE" sz="1400" dirty="0" err="1" smtClean="0"/>
-              <a:t>Steyl</a:t>
-            </a:r>
-            <a:r>
-              <a:rPr lang="de-DE" sz="1400" dirty="0" smtClean="0"/>
-              <a:t>","Treffpunkt: Dorfplatz"],</a:t>
-            </a:r>
-          </a:p>
-          <a:p>
-            <a:pPr marL="0" indent="0">
-              <a:buNone/>
-            </a:pPr>
-            <a:r>
-              <a:rPr lang="de-DE" sz="1400" dirty="0" smtClean="0"/>
-              <a:t>	  ["20.02.2016","Theaterfahrt der </a:t>
-            </a:r>
-            <a:r>
-              <a:rPr lang="de-DE" sz="1400" dirty="0" err="1" smtClean="0"/>
-              <a:t>Landfrauen","Treffpunkt</a:t>
-            </a:r>
-            <a:r>
-              <a:rPr lang="de-DE" sz="1400" dirty="0" smtClean="0"/>
-              <a:t>: 	  	  Dorfplatz"],</a:t>
-            </a:r>
-          </a:p>
-          <a:p>
-            <a:pPr marL="0" indent="0">
-              <a:buNone/>
-            </a:pPr>
-            <a:r>
-              <a:rPr lang="de-DE" sz="1400" dirty="0" smtClean="0"/>
-              <a:t>	  ["","",""],</a:t>
-            </a:r>
-          </a:p>
-          <a:p>
-            <a:pPr marL="0" indent="0">
-              <a:buNone/>
-            </a:pPr>
-            <a:r>
-              <a:rPr lang="de-DE" sz="1400" dirty="0"/>
-              <a:t>	</a:t>
-            </a:r>
-            <a:r>
-              <a:rPr lang="de-DE" sz="1400" dirty="0" smtClean="0"/>
-              <a:t>]</a:t>
-            </a:r>
-          </a:p>
-          <a:p>
-            <a:pPr marL="0" indent="0">
-              <a:buNone/>
-            </a:pPr>
-            <a:r>
-              <a:rPr lang="de-DE" sz="1400" dirty="0"/>
-              <a:t>}</a:t>
-            </a:r>
-            <a:endParaRPr lang="de-DE" sz="1400" dirty="0" smtClean="0"/>
-          </a:p>
-        </p:txBody>
-      </p:sp>
-      <p:sp>
-        <p:nvSpPr>
-          <p:cNvPr id="4" name="Inhaltsplatzhalter 3"/>
-          <p:cNvSpPr>
-            <a:spLocks noGrp="1"/>
-          </p:cNvSpPr>
-          <p:nvPr>
-            <p:ph sz="half" idx="2"/>
-          </p:nvPr>
-        </p:nvSpPr>
-        <p:spPr>
-          <a:xfrm>
-            <a:off x="6122126" y="1825625"/>
-            <a:ext cx="5231674" cy="4351338"/>
+            <a:off x="838200" y="4750058"/>
+            <a:ext cx="10515600" cy="2021445"/>
           </a:xfrm>
         </p:spPr>
         <p:txBody>
@@ -4198,7 +5461,162 @@
           </a:bodyPr>
           <a:lstStyle/>
           <a:p>
+            <a:r>
+              <a:rPr lang="de-DE" dirty="0" smtClean="0"/>
+              <a:t>Speichert Termine in einem Array</a:t>
+            </a:r>
+          </a:p>
+          <a:p>
+            <a:r>
+              <a:rPr lang="de-DE" dirty="0" smtClean="0"/>
+              <a:t>Jeder Termin hat 3 Werte: Datum, Ereignis, Ort</a:t>
+            </a:r>
+          </a:p>
+          <a:p>
+            <a:r>
+              <a:rPr lang="de-DE" dirty="0" smtClean="0"/>
+              <a:t>wird von „termine</a:t>
+            </a:r>
+            <a:r>
+              <a:rPr lang="de-DE" dirty="0" smtClean="0"/>
+              <a:t>.js“ verwendet</a:t>
+            </a:r>
             <a:endParaRPr lang="de-DE" dirty="0"/>
+          </a:p>
+        </p:txBody>
+      </p:sp>
+      <p:sp>
+        <p:nvSpPr>
+          <p:cNvPr id="5" name="Rechteck 4"/>
+          <p:cNvSpPr/>
+          <p:nvPr/>
+        </p:nvSpPr>
+        <p:spPr>
+          <a:xfrm>
+            <a:off x="838200" y="1690688"/>
+            <a:ext cx="8089557" cy="2862322"/>
+          </a:xfrm>
+          <a:prstGeom prst="rect">
+            <a:avLst/>
+          </a:prstGeom>
+        </p:spPr>
+        <p:txBody>
+          <a:bodyPr wrap="square">
+            <a:spAutoFit/>
+          </a:bodyPr>
+          <a:lstStyle/>
+          <a:p>
+            <a:r>
+              <a:rPr lang="de-DE" dirty="0"/>
+              <a:t>{</a:t>
+            </a:r>
+          </a:p>
+          <a:p>
+            <a:r>
+              <a:rPr lang="de-DE" dirty="0"/>
+              <a:t>	"</a:t>
+            </a:r>
+            <a:r>
+              <a:rPr lang="de-DE" dirty="0" err="1"/>
+              <a:t>termine</a:t>
+            </a:r>
+            <a:r>
+              <a:rPr lang="de-DE" dirty="0"/>
+              <a:t>" : </a:t>
+            </a:r>
+          </a:p>
+          <a:p>
+            <a:r>
+              <a:rPr lang="de-DE" dirty="0"/>
+              <a:t>	[</a:t>
+            </a:r>
+          </a:p>
+          <a:p>
+            <a:r>
+              <a:rPr lang="de-DE" dirty="0"/>
+              <a:t>		</a:t>
+            </a:r>
+            <a:r>
+              <a:rPr lang="de-DE" dirty="0" smtClean="0"/>
+              <a:t>["</a:t>
+            </a:r>
+            <a:r>
+              <a:rPr lang="de-DE" dirty="0"/>
+              <a:t>09.02.2016","Seniorennachmittag","Jugendheim"],</a:t>
+            </a:r>
+          </a:p>
+          <a:p>
+            <a:r>
+              <a:rPr lang="de-DE" dirty="0"/>
+              <a:t>		["10.02.2016","Wortgottesdienst zu </a:t>
+            </a:r>
+            <a:r>
+              <a:rPr lang="de-DE" dirty="0" err="1"/>
+              <a:t>Aschermittwoch","Kirche</a:t>
+            </a:r>
+            <a:r>
+              <a:rPr lang="de-DE" dirty="0"/>
+              <a:t>"],</a:t>
+            </a:r>
+          </a:p>
+          <a:p>
+            <a:r>
+              <a:rPr lang="de-DE" dirty="0"/>
+              <a:t>		</a:t>
+            </a:r>
+            <a:r>
+              <a:rPr lang="de-DE" dirty="0" smtClean="0"/>
+              <a:t>["</a:t>
+            </a:r>
+            <a:r>
+              <a:rPr lang="de-DE" dirty="0"/>
+              <a:t>22.02.2016</a:t>
+            </a:r>
+            <a:r>
+              <a:rPr lang="de-DE" dirty="0" smtClean="0"/>
+              <a:t>",„Jahreshauptversammlung","</a:t>
+            </a:r>
+            <a:r>
+              <a:rPr lang="de-DE" dirty="0"/>
+              <a:t>Gaststätte </a:t>
+            </a:r>
+            <a:r>
+              <a:rPr lang="de-DE" dirty="0" err="1"/>
+              <a:t>Luyven</a:t>
+            </a:r>
+            <a:r>
+              <a:rPr lang="de-DE" dirty="0"/>
+              <a:t>"],</a:t>
+            </a:r>
+          </a:p>
+          <a:p>
+            <a:r>
+              <a:rPr lang="de-DE" dirty="0"/>
+              <a:t>		["","",""],</a:t>
+            </a:r>
+          </a:p>
+          <a:p>
+            <a:r>
+              <a:rPr lang="de-DE" dirty="0"/>
+              <a:t>		["02.03.2016","Seniorennachmittag","Jugendheim</a:t>
+            </a:r>
+            <a:r>
+              <a:rPr lang="de-DE" dirty="0" smtClean="0"/>
+              <a:t>"]</a:t>
+            </a:r>
+          </a:p>
+          <a:p>
+            <a:r>
+              <a:rPr lang="de-DE" dirty="0" smtClean="0"/>
+              <a:t>	]</a:t>
+            </a:r>
+            <a:endParaRPr lang="de-DE" dirty="0"/>
+          </a:p>
+          <a:p>
+            <a:r>
+              <a:rPr lang="de-DE" dirty="0"/>
+              <a:t>}</a:t>
+            </a:r>
           </a:p>
         </p:txBody>
       </p:sp>

</xml_diff>